<commit_message>
updated with latest 1000value mask
</commit_message>
<xml_diff>
--- a/material/perchange/meth.pptx
+++ b/material/perchange/meth.pptx
@@ -104,6 +104,11 @@
       </a:defRPr>
     </a:lvl9pPr>
   </p:defaultTextStyle>
+  <p:extLst>
+    <p:ext uri="{EFAFB233-063F-42B5-8137-9DF3F51BA10A}">
+      <p15:sldGuideLst xmlns:p15="http://schemas.microsoft.com/office/powerpoint/2012/main"/>
+    </p:ext>
+  </p:extLst>
 </p:presentation>
 </file>
 
@@ -238,7 +243,7 @@
           <a:p>
             <a:fld id="{410D71DB-89DC-4372-BC84-546A755B97F9}" type="datetimeFigureOut">
               <a:rPr lang="en-PK" smtClean="0"/>
-              <a:t>26/06/2022</a:t>
+              <a:t>05/07/2022</a:t>
             </a:fld>
             <a:endParaRPr lang="en-PK"/>
           </a:p>
@@ -408,7 +413,7 @@
           <a:p>
             <a:fld id="{410D71DB-89DC-4372-BC84-546A755B97F9}" type="datetimeFigureOut">
               <a:rPr lang="en-PK" smtClean="0"/>
-              <a:t>26/06/2022</a:t>
+              <a:t>05/07/2022</a:t>
             </a:fld>
             <a:endParaRPr lang="en-PK"/>
           </a:p>
@@ -588,7 +593,7 @@
           <a:p>
             <a:fld id="{410D71DB-89DC-4372-BC84-546A755B97F9}" type="datetimeFigureOut">
               <a:rPr lang="en-PK" smtClean="0"/>
-              <a:t>26/06/2022</a:t>
+              <a:t>05/07/2022</a:t>
             </a:fld>
             <a:endParaRPr lang="en-PK"/>
           </a:p>
@@ -758,7 +763,7 @@
           <a:p>
             <a:fld id="{410D71DB-89DC-4372-BC84-546A755B97F9}" type="datetimeFigureOut">
               <a:rPr lang="en-PK" smtClean="0"/>
-              <a:t>26/06/2022</a:t>
+              <a:t>05/07/2022</a:t>
             </a:fld>
             <a:endParaRPr lang="en-PK"/>
           </a:p>
@@ -1004,7 +1009,7 @@
           <a:p>
             <a:fld id="{410D71DB-89DC-4372-BC84-546A755B97F9}" type="datetimeFigureOut">
               <a:rPr lang="en-PK" smtClean="0"/>
-              <a:t>26/06/2022</a:t>
+              <a:t>05/07/2022</a:t>
             </a:fld>
             <a:endParaRPr lang="en-PK"/>
           </a:p>
@@ -1236,7 +1241,7 @@
           <a:p>
             <a:fld id="{410D71DB-89DC-4372-BC84-546A755B97F9}" type="datetimeFigureOut">
               <a:rPr lang="en-PK" smtClean="0"/>
-              <a:t>26/06/2022</a:t>
+              <a:t>05/07/2022</a:t>
             </a:fld>
             <a:endParaRPr lang="en-PK"/>
           </a:p>
@@ -1603,7 +1608,7 @@
           <a:p>
             <a:fld id="{410D71DB-89DC-4372-BC84-546A755B97F9}" type="datetimeFigureOut">
               <a:rPr lang="en-PK" smtClean="0"/>
-              <a:t>26/06/2022</a:t>
+              <a:t>05/07/2022</a:t>
             </a:fld>
             <a:endParaRPr lang="en-PK"/>
           </a:p>
@@ -1721,7 +1726,7 @@
           <a:p>
             <a:fld id="{410D71DB-89DC-4372-BC84-546A755B97F9}" type="datetimeFigureOut">
               <a:rPr lang="en-PK" smtClean="0"/>
-              <a:t>26/06/2022</a:t>
+              <a:t>05/07/2022</a:t>
             </a:fld>
             <a:endParaRPr lang="en-PK"/>
           </a:p>
@@ -1816,7 +1821,7 @@
           <a:p>
             <a:fld id="{410D71DB-89DC-4372-BC84-546A755B97F9}" type="datetimeFigureOut">
               <a:rPr lang="en-PK" smtClean="0"/>
-              <a:t>26/06/2022</a:t>
+              <a:t>05/07/2022</a:t>
             </a:fld>
             <a:endParaRPr lang="en-PK"/>
           </a:p>
@@ -2093,7 +2098,7 @@
           <a:p>
             <a:fld id="{410D71DB-89DC-4372-BC84-546A755B97F9}" type="datetimeFigureOut">
               <a:rPr lang="en-PK" smtClean="0"/>
-              <a:t>26/06/2022</a:t>
+              <a:t>05/07/2022</a:t>
             </a:fld>
             <a:endParaRPr lang="en-PK"/>
           </a:p>
@@ -2350,7 +2355,7 @@
           <a:p>
             <a:fld id="{410D71DB-89DC-4372-BC84-546A755B97F9}" type="datetimeFigureOut">
               <a:rPr lang="en-PK" smtClean="0"/>
-              <a:t>26/06/2022</a:t>
+              <a:t>05/07/2022</a:t>
             </a:fld>
             <a:endParaRPr lang="en-PK"/>
           </a:p>
@@ -2563,7 +2568,7 @@
           <a:p>
             <a:fld id="{410D71DB-89DC-4372-BC84-546A755B97F9}" type="datetimeFigureOut">
               <a:rPr lang="en-PK" smtClean="0"/>
-              <a:t>26/06/2022</a:t>
+              <a:t>05/07/2022</a:t>
             </a:fld>
             <a:endParaRPr lang="en-PK"/>
           </a:p>
@@ -2982,8 +2987,8 @@
         </p:nvSpPr>
         <p:spPr>
           <a:xfrm>
-            <a:off x="948267" y="1337734"/>
-            <a:ext cx="1320800" cy="1320800"/>
+            <a:off x="79263" y="1331249"/>
+            <a:ext cx="1223243" cy="1115979"/>
           </a:xfrm>
           <a:prstGeom prst="ellipse">
             <a:avLst/>
@@ -3044,8 +3049,8 @@
         </p:nvSpPr>
         <p:spPr>
           <a:xfrm>
-            <a:off x="948267" y="4199466"/>
-            <a:ext cx="1320800" cy="1320800"/>
+            <a:off x="79263" y="4192981"/>
+            <a:ext cx="1223243" cy="1115979"/>
           </a:xfrm>
           <a:prstGeom prst="ellipse">
             <a:avLst/>
@@ -3106,8 +3111,8 @@
         </p:nvSpPr>
         <p:spPr>
           <a:xfrm>
-            <a:off x="3064934" y="1278467"/>
-            <a:ext cx="1905000" cy="1320800"/>
+            <a:off x="2049520" y="1331249"/>
+            <a:ext cx="1764293" cy="1115979"/>
           </a:xfrm>
           <a:prstGeom prst="rect">
             <a:avLst/>
@@ -3161,8 +3166,8 @@
         </p:nvSpPr>
         <p:spPr>
           <a:xfrm>
-            <a:off x="3064934" y="4199466"/>
-            <a:ext cx="1905000" cy="1320800"/>
+            <a:off x="2047298" y="4192981"/>
+            <a:ext cx="1764293" cy="1115979"/>
           </a:xfrm>
           <a:prstGeom prst="rect">
             <a:avLst/>
@@ -3216,8 +3221,8 @@
         </p:nvSpPr>
         <p:spPr>
           <a:xfrm>
-            <a:off x="5503333" y="1278467"/>
-            <a:ext cx="2675467" cy="1320800"/>
+            <a:off x="4316365" y="1331249"/>
+            <a:ext cx="2006614" cy="1089916"/>
           </a:xfrm>
           <a:prstGeom prst="flowChartPredefinedProcess">
             <a:avLst/>
@@ -3315,8 +3320,8 @@
         </p:nvSpPr>
         <p:spPr>
           <a:xfrm>
-            <a:off x="5503332" y="4199466"/>
-            <a:ext cx="2675467" cy="1320800"/>
+            <a:off x="4327139" y="4219044"/>
+            <a:ext cx="2006614" cy="1089916"/>
           </a:xfrm>
           <a:prstGeom prst="flowChartPredefinedProcess">
             <a:avLst/>
@@ -3416,8 +3421,8 @@
             </p:nvSpPr>
             <p:spPr>
               <a:xfrm>
-                <a:off x="8864599" y="2768600"/>
-                <a:ext cx="2675467" cy="1320800"/>
+                <a:off x="6558896" y="2762114"/>
+                <a:ext cx="2477852" cy="1115979"/>
               </a:xfrm>
               <a:prstGeom prst="flowChartDocument">
                 <a:avLst/>
@@ -3538,8 +3543,8 @@
             </p:nvSpPr>
             <p:spPr>
               <a:xfrm>
-                <a:off x="8864599" y="2768600"/>
-                <a:ext cx="2675467" cy="1320800"/>
+                <a:off x="6558896" y="2762114"/>
+                <a:ext cx="2477852" cy="1115979"/>
               </a:xfrm>
               <a:prstGeom prst="flowChartDocument">
                 <a:avLst/>
@@ -3547,7 +3552,7 @@
               <a:blipFill>
                 <a:blip r:embed="rId2"/>
                 <a:stretch>
-                  <a:fillRect/>
+                  <a:fillRect l="-1471" t="-4372" r="-1225"/>
                 </a:stretch>
               </a:blipFill>
             </p:spPr>
@@ -3580,8 +3585,8 @@
         </p:nvSpPr>
         <p:spPr>
           <a:xfrm>
-            <a:off x="2269067" y="1862667"/>
-            <a:ext cx="795867" cy="270933"/>
+            <a:off x="1302506" y="1774779"/>
+            <a:ext cx="737083" cy="228918"/>
           </a:xfrm>
           <a:prstGeom prst="rightArrow">
             <a:avLst/>
@@ -3626,8 +3631,8 @@
         </p:nvSpPr>
         <p:spPr>
           <a:xfrm>
-            <a:off x="2269067" y="4732868"/>
-            <a:ext cx="795867" cy="270933"/>
+            <a:off x="1299441" y="4669139"/>
+            <a:ext cx="737083" cy="228918"/>
           </a:xfrm>
           <a:prstGeom prst="rightArrow">
             <a:avLst/>
@@ -3672,8 +3677,8 @@
         </p:nvSpPr>
         <p:spPr>
           <a:xfrm>
-            <a:off x="4969934" y="1862667"/>
-            <a:ext cx="533398" cy="228600"/>
+            <a:off x="3811591" y="1863176"/>
+            <a:ext cx="494000" cy="193150"/>
           </a:xfrm>
           <a:prstGeom prst="rightArrow">
             <a:avLst/>
@@ -3718,8 +3723,8 @@
         </p:nvSpPr>
         <p:spPr>
           <a:xfrm>
-            <a:off x="4969934" y="4732868"/>
-            <a:ext cx="533398" cy="228600"/>
+            <a:off x="3822365" y="4712094"/>
+            <a:ext cx="494000" cy="193150"/>
           </a:xfrm>
           <a:prstGeom prst="rightArrow">
             <a:avLst/>
@@ -3752,10 +3757,10 @@
       </p:sp>
       <p:sp>
         <p:nvSpPr>
-          <p:cNvPr id="20" name="Arrow: Right 19">
+          <p:cNvPr id="21" name="Arrow: Right 20">
             <a:extLst>
               <a:ext uri="{FF2B5EF4-FFF2-40B4-BE49-F238E27FC236}">
-                <a16:creationId xmlns:a16="http://schemas.microsoft.com/office/drawing/2014/main" id="{C7135D58-8617-417B-848F-03E62978B1DE}"/>
+                <a16:creationId xmlns:a16="http://schemas.microsoft.com/office/drawing/2014/main" id="{65239F1E-F6C2-4F0D-8BAA-1A6DE78157D9}"/>
               </a:ext>
             </a:extLst>
           </p:cNvPr>
@@ -3763,9 +3768,9 @@
           <p:nvPr/>
         </p:nvSpPr>
         <p:spPr>
-          <a:xfrm rot="2917857">
-            <a:off x="8082734" y="2333160"/>
-            <a:ext cx="838201" cy="228600"/>
+          <a:xfrm rot="19380132">
+            <a:off x="6280688" y="4157023"/>
+            <a:ext cx="977432" cy="186472"/>
           </a:xfrm>
           <a:prstGeom prst="rightArrow">
             <a:avLst/>
@@ -3798,10 +3803,10 @@
       </p:sp>
       <p:sp>
         <p:nvSpPr>
-          <p:cNvPr id="21" name="Arrow: Right 20">
+          <p:cNvPr id="15" name="Arrow: Right 14">
             <a:extLst>
               <a:ext uri="{FF2B5EF4-FFF2-40B4-BE49-F238E27FC236}">
-                <a16:creationId xmlns:a16="http://schemas.microsoft.com/office/drawing/2014/main" id="{65239F1E-F6C2-4F0D-8BAA-1A6DE78157D9}"/>
+                <a16:creationId xmlns:a16="http://schemas.microsoft.com/office/drawing/2014/main" id="{EB172AB9-95D4-4077-97E5-4D6832706BA4}"/>
               </a:ext>
             </a:extLst>
           </p:cNvPr>
@@ -3809,9 +3814,112 @@
           <p:nvPr/>
         </p:nvSpPr>
         <p:spPr>
-          <a:xfrm rot="19380132">
-            <a:off x="8163200" y="4249672"/>
-            <a:ext cx="838201" cy="228600"/>
+          <a:xfrm rot="2794449">
+            <a:off x="6208699" y="2248049"/>
+            <a:ext cx="977432" cy="186472"/>
+          </a:xfrm>
+          <a:prstGeom prst="rightArrow">
+            <a:avLst/>
+          </a:prstGeom>
+        </p:spPr>
+        <p:style>
+          <a:lnRef idx="2">
+            <a:schemeClr val="dk1">
+              <a:shade val="50000"/>
+            </a:schemeClr>
+          </a:lnRef>
+          <a:fillRef idx="1">
+            <a:schemeClr val="dk1"/>
+          </a:fillRef>
+          <a:effectRef idx="0">
+            <a:schemeClr val="dk1"/>
+          </a:effectRef>
+          <a:fontRef idx="minor">
+            <a:schemeClr val="lt1"/>
+          </a:fontRef>
+        </p:style>
+        <p:txBody>
+          <a:bodyPr rtlCol="0" anchor="ctr"/>
+          <a:lstStyle/>
+          <a:p>
+            <a:pPr algn="ctr"/>
+            <a:endParaRPr lang="en-PK"/>
+          </a:p>
+        </p:txBody>
+      </p:sp>
+      <p:sp>
+        <p:nvSpPr>
+          <p:cNvPr id="3" name="Flowchart: Magnetic Disk 2">
+            <a:extLst>
+              <a:ext uri="{FF2B5EF4-FFF2-40B4-BE49-F238E27FC236}">
+                <a16:creationId xmlns:a16="http://schemas.microsoft.com/office/drawing/2014/main" id="{1CFA77A9-9578-4263-98E5-1C6FDE49DB93}"/>
+              </a:ext>
+            </a:extLst>
+          </p:cNvPr>
+          <p:cNvSpPr/>
+          <p:nvPr/>
+        </p:nvSpPr>
+        <p:spPr>
+          <a:xfrm>
+            <a:off x="9578932" y="2537426"/>
+            <a:ext cx="2143191" cy="1456807"/>
+          </a:xfrm>
+          <a:prstGeom prst="flowChartMagneticDisk">
+            <a:avLst/>
+          </a:prstGeom>
+        </p:spPr>
+        <p:style>
+          <a:lnRef idx="2">
+            <a:schemeClr val="accent1">
+              <a:shade val="50000"/>
+            </a:schemeClr>
+          </a:lnRef>
+          <a:fillRef idx="1">
+            <a:schemeClr val="accent1"/>
+          </a:fillRef>
+          <a:effectRef idx="0">
+            <a:schemeClr val="accent1"/>
+          </a:effectRef>
+          <a:fontRef idx="minor">
+            <a:schemeClr val="lt1"/>
+          </a:fontRef>
+        </p:style>
+        <p:txBody>
+          <a:bodyPr rtlCol="0" anchor="ctr"/>
+          <a:lstStyle/>
+          <a:p>
+            <a:pPr algn="ctr"/>
+            <a:r>
+              <a:rPr lang="en-US" dirty="0"/>
+              <a:t>Masked Values </a:t>
+            </a:r>
+          </a:p>
+          <a:p>
+            <a:pPr algn="ctr"/>
+            <a:r>
+              <a:rPr lang="en-US" dirty="0"/>
+              <a:t>(&lt;1000) to 0</a:t>
+            </a:r>
+            <a:endParaRPr lang="en-PK" dirty="0"/>
+          </a:p>
+        </p:txBody>
+      </p:sp>
+      <p:sp>
+        <p:nvSpPr>
+          <p:cNvPr id="22" name="Arrow: Right 21">
+            <a:extLst>
+              <a:ext uri="{FF2B5EF4-FFF2-40B4-BE49-F238E27FC236}">
+                <a16:creationId xmlns:a16="http://schemas.microsoft.com/office/drawing/2014/main" id="{2F10FC41-6250-4C42-A920-E8DC392BB0C7}"/>
+              </a:ext>
+            </a:extLst>
+          </p:cNvPr>
+          <p:cNvSpPr/>
+          <p:nvPr/>
+        </p:nvSpPr>
+        <p:spPr>
+          <a:xfrm>
+            <a:off x="9036748" y="3152864"/>
+            <a:ext cx="544269" cy="212906"/>
           </a:xfrm>
           <a:prstGeom prst="rightArrow">
             <a:avLst/>

</xml_diff>